<commit_message>
Jazz controls moved to library
</commit_message>
<xml_diff>
--- a/Description/JazzTasksPictures.pptx
+++ b/Description/JazzTasksPictures.pptx
@@ -258,7 +258,7 @@
           <a:p>
             <a:fld id="{DDCE6D58-9B57-4731-A47B-3CD41B48F0A9}" type="datetimeFigureOut">
               <a:rPr lang="de-CH" smtClean="0"/>
-              <a:t>30.04.2023</a:t>
+              <a:t>10.06.2023</a:t>
             </a:fld>
             <a:endParaRPr lang="de-CH"/>
           </a:p>
@@ -428,7 +428,7 @@
           <a:p>
             <a:fld id="{DDCE6D58-9B57-4731-A47B-3CD41B48F0A9}" type="datetimeFigureOut">
               <a:rPr lang="de-CH" smtClean="0"/>
-              <a:t>30.04.2023</a:t>
+              <a:t>10.06.2023</a:t>
             </a:fld>
             <a:endParaRPr lang="de-CH"/>
           </a:p>
@@ -608,7 +608,7 @@
           <a:p>
             <a:fld id="{DDCE6D58-9B57-4731-A47B-3CD41B48F0A9}" type="datetimeFigureOut">
               <a:rPr lang="de-CH" smtClean="0"/>
-              <a:t>30.04.2023</a:t>
+              <a:t>10.06.2023</a:t>
             </a:fld>
             <a:endParaRPr lang="de-CH"/>
           </a:p>
@@ -778,7 +778,7 @@
           <a:p>
             <a:fld id="{DDCE6D58-9B57-4731-A47B-3CD41B48F0A9}" type="datetimeFigureOut">
               <a:rPr lang="de-CH" smtClean="0"/>
-              <a:t>30.04.2023</a:t>
+              <a:t>10.06.2023</a:t>
             </a:fld>
             <a:endParaRPr lang="de-CH"/>
           </a:p>
@@ -1024,7 +1024,7 @@
           <a:p>
             <a:fld id="{DDCE6D58-9B57-4731-A47B-3CD41B48F0A9}" type="datetimeFigureOut">
               <a:rPr lang="de-CH" smtClean="0"/>
-              <a:t>30.04.2023</a:t>
+              <a:t>10.06.2023</a:t>
             </a:fld>
             <a:endParaRPr lang="de-CH"/>
           </a:p>
@@ -1256,7 +1256,7 @@
           <a:p>
             <a:fld id="{DDCE6D58-9B57-4731-A47B-3CD41B48F0A9}" type="datetimeFigureOut">
               <a:rPr lang="de-CH" smtClean="0"/>
-              <a:t>30.04.2023</a:t>
+              <a:t>10.06.2023</a:t>
             </a:fld>
             <a:endParaRPr lang="de-CH"/>
           </a:p>
@@ -1623,7 +1623,7 @@
           <a:p>
             <a:fld id="{DDCE6D58-9B57-4731-A47B-3CD41B48F0A9}" type="datetimeFigureOut">
               <a:rPr lang="de-CH" smtClean="0"/>
-              <a:t>30.04.2023</a:t>
+              <a:t>10.06.2023</a:t>
             </a:fld>
             <a:endParaRPr lang="de-CH"/>
           </a:p>
@@ -1741,7 +1741,7 @@
           <a:p>
             <a:fld id="{DDCE6D58-9B57-4731-A47B-3CD41B48F0A9}" type="datetimeFigureOut">
               <a:rPr lang="de-CH" smtClean="0"/>
-              <a:t>30.04.2023</a:t>
+              <a:t>10.06.2023</a:t>
             </a:fld>
             <a:endParaRPr lang="de-CH"/>
           </a:p>
@@ -1836,7 +1836,7 @@
           <a:p>
             <a:fld id="{DDCE6D58-9B57-4731-A47B-3CD41B48F0A9}" type="datetimeFigureOut">
               <a:rPr lang="de-CH" smtClean="0"/>
-              <a:t>30.04.2023</a:t>
+              <a:t>10.06.2023</a:t>
             </a:fld>
             <a:endParaRPr lang="de-CH"/>
           </a:p>
@@ -2113,7 +2113,7 @@
           <a:p>
             <a:fld id="{DDCE6D58-9B57-4731-A47B-3CD41B48F0A9}" type="datetimeFigureOut">
               <a:rPr lang="de-CH" smtClean="0"/>
-              <a:t>30.04.2023</a:t>
+              <a:t>10.06.2023</a:t>
             </a:fld>
             <a:endParaRPr lang="de-CH"/>
           </a:p>
@@ -2366,7 +2366,7 @@
           <a:p>
             <a:fld id="{DDCE6D58-9B57-4731-A47B-3CD41B48F0A9}" type="datetimeFigureOut">
               <a:rPr lang="de-CH" smtClean="0"/>
-              <a:t>30.04.2023</a:t>
+              <a:t>10.06.2023</a:t>
             </a:fld>
             <a:endParaRPr lang="de-CH"/>
           </a:p>
@@ -2579,7 +2579,7 @@
           <a:p>
             <a:fld id="{DDCE6D58-9B57-4731-A47B-3CD41B48F0A9}" type="datetimeFigureOut">
               <a:rPr lang="de-CH" smtClean="0"/>
-              <a:t>30.04.2023</a:t>
+              <a:t>10.06.2023</a:t>
             </a:fld>
             <a:endParaRPr lang="de-CH"/>
           </a:p>

</xml_diff>